<commit_message>
added pdf for tableau,notebook and presentation
</commit_message>
<xml_diff>
--- a/Cleaning_Analysis_of_ntsb_presentation.pptx
+++ b/Cleaning_Analysis_of_ntsb_presentation.pptx
@@ -5,22 +5,24 @@
     <p:sldMasterId id="2147483717" r:id="rId4"/>
   </p:sldMasterIdLst>
   <p:notesMasterIdLst>
-    <p:notesMasterId r:id="rId15"/>
+    <p:notesMasterId r:id="rId17"/>
   </p:notesMasterIdLst>
   <p:handoutMasterIdLst>
-    <p:handoutMasterId r:id="rId16"/>
+    <p:handoutMasterId r:id="rId18"/>
   </p:handoutMasterIdLst>
   <p:sldIdLst>
     <p:sldId id="258" r:id="rId5"/>
-    <p:sldId id="284" r:id="rId6"/>
-    <p:sldId id="294" r:id="rId7"/>
-    <p:sldId id="267" r:id="rId8"/>
-    <p:sldId id="293" r:id="rId9"/>
-    <p:sldId id="268" r:id="rId10"/>
-    <p:sldId id="291" r:id="rId11"/>
-    <p:sldId id="275" r:id="rId12"/>
-    <p:sldId id="292" r:id="rId13"/>
-    <p:sldId id="290" r:id="rId14"/>
+    <p:sldId id="267" r:id="rId6"/>
+    <p:sldId id="284" r:id="rId7"/>
+    <p:sldId id="294" r:id="rId8"/>
+    <p:sldId id="296" r:id="rId9"/>
+    <p:sldId id="293" r:id="rId10"/>
+    <p:sldId id="268" r:id="rId11"/>
+    <p:sldId id="291" r:id="rId12"/>
+    <p:sldId id="275" r:id="rId13"/>
+    <p:sldId id="292" r:id="rId14"/>
+    <p:sldId id="295" r:id="rId15"/>
+    <p:sldId id="290" r:id="rId16"/>
   </p:sldIdLst>
   <p:sldSz cx="12192000" cy="6858000"/>
   <p:notesSz cx="6858000" cy="9144000"/>
@@ -224,7 +226,7 @@
           <a:p>
             <a:fld id="{6748E1AF-6343-46AA-8AEF-4C12F4118850}" type="datetimeFigureOut">
               <a:rPr lang="en-US" smtClean="0"/>
-              <a:t>11/29/2024</a:t>
+              <a:t>12/1/2024</a:t>
             </a:fld>
             <a:endParaRPr lang="en-US" dirty="0"/>
           </a:p>
@@ -401,7 +403,7 @@
           <a:p>
             <a:fld id="{DA9D2517-63AA-420A-887D-BE60360A8F4D}" type="datetimeFigureOut">
               <a:rPr lang="en-US" noProof="0" smtClean="0"/>
-              <a:t>11/29/2024</a:t>
+              <a:t>12/1/2024</a:t>
             </a:fld>
             <a:endParaRPr lang="en-US" noProof="0" dirty="0"/>
           </a:p>
@@ -817,7 +819,7 @@
           <a:p>
             <a:fld id="{284ECAD9-32EE-4091-BDA5-6BD15ACC5E58}" type="slidenum">
               <a:rPr lang="en-US" noProof="0" smtClean="0"/>
-              <a:t>4</a:t>
+              <a:t>2</a:t>
             </a:fld>
             <a:endParaRPr lang="en-US" noProof="0" dirty="0"/>
           </a:p>
@@ -910,7 +912,7 @@
     </p:spTree>
     <p:extLst>
       <p:ext uri="{BB962C8B-B14F-4D97-AF65-F5344CB8AC3E}">
-        <p14:creationId xmlns:p14="http://schemas.microsoft.com/office/powerpoint/2010/main" val="1656360510"/>
+        <p14:creationId xmlns:p14="http://schemas.microsoft.com/office/powerpoint/2010/main" val="3353485468"/>
       </p:ext>
     </p:extLst>
   </p:cSld>
@@ -994,7 +996,7 @@
     </p:spTree>
     <p:extLst>
       <p:ext uri="{BB962C8B-B14F-4D97-AF65-F5344CB8AC3E}">
-        <p14:creationId xmlns:p14="http://schemas.microsoft.com/office/powerpoint/2010/main" val="2737502064"/>
+        <p14:creationId xmlns:p14="http://schemas.microsoft.com/office/powerpoint/2010/main" val="1656360510"/>
       </p:ext>
     </p:extLst>
   </p:cSld>
@@ -1078,7 +1080,7 @@
     </p:spTree>
     <p:extLst>
       <p:ext uri="{BB962C8B-B14F-4D97-AF65-F5344CB8AC3E}">
-        <p14:creationId xmlns:p14="http://schemas.microsoft.com/office/powerpoint/2010/main" val="1759787460"/>
+        <p14:creationId xmlns:p14="http://schemas.microsoft.com/office/powerpoint/2010/main" val="2737502064"/>
       </p:ext>
     </p:extLst>
   </p:cSld>
@@ -1162,7 +1164,7 @@
     </p:spTree>
     <p:extLst>
       <p:ext uri="{BB962C8B-B14F-4D97-AF65-F5344CB8AC3E}">
-        <p14:creationId xmlns:p14="http://schemas.microsoft.com/office/powerpoint/2010/main" val="3687459360"/>
+        <p14:creationId xmlns:p14="http://schemas.microsoft.com/office/powerpoint/2010/main" val="1759787460"/>
       </p:ext>
     </p:extLst>
   </p:cSld>
@@ -1246,7 +1248,175 @@
     </p:spTree>
     <p:extLst>
       <p:ext uri="{BB962C8B-B14F-4D97-AF65-F5344CB8AC3E}">
+        <p14:creationId xmlns:p14="http://schemas.microsoft.com/office/powerpoint/2010/main" val="3687459360"/>
+      </p:ext>
+    </p:extLst>
+  </p:cSld>
+  <p:clrMapOvr>
+    <a:masterClrMapping/>
+  </p:clrMapOvr>
+</p:notes>
+</file>
+
+<file path=ppt/notesSlides/notesSlide8.xml><?xml version="1.0" encoding="utf-8"?>
+<p:notes xmlns:a="http://schemas.openxmlformats.org/drawingml/2006/main" xmlns:r="http://schemas.openxmlformats.org/officeDocument/2006/relationships" xmlns:p="http://schemas.openxmlformats.org/presentationml/2006/main">
+  <p:cSld>
+    <p:spTree>
+      <p:nvGrpSpPr>
+        <p:cNvPr id="1" name=""/>
+        <p:cNvGrpSpPr/>
+        <p:nvPr/>
+      </p:nvGrpSpPr>
+      <p:grpSpPr>
+        <a:xfrm>
+          <a:off x="0" y="0"/>
+          <a:ext cx="0" cy="0"/>
+          <a:chOff x="0" y="0"/>
+          <a:chExt cx="0" cy="0"/>
+        </a:xfrm>
+      </p:grpSpPr>
+      <p:sp>
+        <p:nvSpPr>
+          <p:cNvPr id="2" name="Slide Image Placeholder 1"/>
+          <p:cNvSpPr>
+            <a:spLocks noGrp="1" noRot="1" noChangeAspect="1"/>
+          </p:cNvSpPr>
+          <p:nvPr>
+            <p:ph type="sldImg"/>
+          </p:nvPr>
+        </p:nvSpPr>
+        <p:spPr/>
+      </p:sp>
+      <p:sp>
+        <p:nvSpPr>
+          <p:cNvPr id="3" name="Notes Placeholder 2"/>
+          <p:cNvSpPr>
+            <a:spLocks noGrp="1"/>
+          </p:cNvSpPr>
+          <p:nvPr>
+            <p:ph type="body" idx="1"/>
+          </p:nvPr>
+        </p:nvSpPr>
+        <p:spPr/>
+        <p:txBody>
+          <a:bodyPr/>
+          <a:lstStyle/>
+          <a:p>
+            <a:endParaRPr lang="en-US" dirty="0"/>
+          </a:p>
+        </p:txBody>
+      </p:sp>
+      <p:sp>
+        <p:nvSpPr>
+          <p:cNvPr id="4" name="Slide Number Placeholder 3"/>
+          <p:cNvSpPr>
+            <a:spLocks noGrp="1"/>
+          </p:cNvSpPr>
+          <p:nvPr>
+            <p:ph type="sldNum" sz="quarter" idx="5"/>
+          </p:nvPr>
+        </p:nvSpPr>
+        <p:spPr/>
+        <p:txBody>
+          <a:bodyPr/>
+          <a:lstStyle/>
+          <a:p>
+            <a:fld id="{284ECAD9-32EE-4091-BDA5-6BD15ACC5E58}" type="slidenum">
+              <a:rPr lang="en-US" noProof="0" smtClean="0"/>
+              <a:t>10</a:t>
+            </a:fld>
+            <a:endParaRPr lang="en-US" noProof="0" dirty="0"/>
+          </a:p>
+        </p:txBody>
+      </p:sp>
+    </p:spTree>
+    <p:extLst>
+      <p:ext uri="{BB962C8B-B14F-4D97-AF65-F5344CB8AC3E}">
         <p14:creationId xmlns:p14="http://schemas.microsoft.com/office/powerpoint/2010/main" val="3710246609"/>
+      </p:ext>
+    </p:extLst>
+  </p:cSld>
+  <p:clrMapOvr>
+    <a:masterClrMapping/>
+  </p:clrMapOvr>
+</p:notes>
+</file>
+
+<file path=ppt/notesSlides/notesSlide9.xml><?xml version="1.0" encoding="utf-8"?>
+<p:notes xmlns:a="http://schemas.openxmlformats.org/drawingml/2006/main" xmlns:r="http://schemas.openxmlformats.org/officeDocument/2006/relationships" xmlns:p="http://schemas.openxmlformats.org/presentationml/2006/main">
+  <p:cSld>
+    <p:spTree>
+      <p:nvGrpSpPr>
+        <p:cNvPr id="1" name=""/>
+        <p:cNvGrpSpPr/>
+        <p:nvPr/>
+      </p:nvGrpSpPr>
+      <p:grpSpPr>
+        <a:xfrm>
+          <a:off x="0" y="0"/>
+          <a:ext cx="0" cy="0"/>
+          <a:chOff x="0" y="0"/>
+          <a:chExt cx="0" cy="0"/>
+        </a:xfrm>
+      </p:grpSpPr>
+      <p:sp>
+        <p:nvSpPr>
+          <p:cNvPr id="2" name="Slide Image Placeholder 1"/>
+          <p:cNvSpPr>
+            <a:spLocks noGrp="1" noRot="1" noChangeAspect="1"/>
+          </p:cNvSpPr>
+          <p:nvPr>
+            <p:ph type="sldImg"/>
+          </p:nvPr>
+        </p:nvSpPr>
+        <p:spPr/>
+      </p:sp>
+      <p:sp>
+        <p:nvSpPr>
+          <p:cNvPr id="3" name="Notes Placeholder 2"/>
+          <p:cNvSpPr>
+            <a:spLocks noGrp="1"/>
+          </p:cNvSpPr>
+          <p:nvPr>
+            <p:ph type="body" idx="1"/>
+          </p:nvPr>
+        </p:nvSpPr>
+        <p:spPr/>
+        <p:txBody>
+          <a:bodyPr/>
+          <a:lstStyle/>
+          <a:p>
+            <a:endParaRPr lang="en-US" dirty="0"/>
+          </a:p>
+        </p:txBody>
+      </p:sp>
+      <p:sp>
+        <p:nvSpPr>
+          <p:cNvPr id="4" name="Slide Number Placeholder 3"/>
+          <p:cNvSpPr>
+            <a:spLocks noGrp="1"/>
+          </p:cNvSpPr>
+          <p:nvPr>
+            <p:ph type="sldNum" sz="quarter" idx="5"/>
+          </p:nvPr>
+        </p:nvSpPr>
+        <p:spPr/>
+        <p:txBody>
+          <a:bodyPr/>
+          <a:lstStyle/>
+          <a:p>
+            <a:fld id="{284ECAD9-32EE-4091-BDA5-6BD15ACC5E58}" type="slidenum">
+              <a:rPr lang="en-US" noProof="0" smtClean="0"/>
+              <a:t>11</a:t>
+            </a:fld>
+            <a:endParaRPr lang="en-US" noProof="0" dirty="0"/>
+          </a:p>
+        </p:txBody>
+      </p:sp>
+    </p:spTree>
+    <p:extLst>
+      <p:ext uri="{BB962C8B-B14F-4D97-AF65-F5344CB8AC3E}">
+        <p14:creationId xmlns:p14="http://schemas.microsoft.com/office/powerpoint/2010/main" val="3390398266"/>
       </p:ext>
     </p:extLst>
   </p:cSld>
@@ -1330,7 +1500,7 @@
           <a:p>
             <a:fld id="{F5CEFB0D-6DB6-450D-981E-DB5B064ABC8F}" type="datetime1">
               <a:rPr lang="en-US" noProof="0" smtClean="0"/>
-              <a:t>11/29/2024</a:t>
+              <a:t>12/1/2024</a:t>
             </a:fld>
             <a:endParaRPr lang="en-US" noProof="0" dirty="0"/>
           </a:p>
@@ -1948,7 +2118,7 @@
           <a:p>
             <a:fld id="{3AB9C849-F1D8-4230-9F2F-9250D675BB2A}" type="datetime1">
               <a:rPr lang="en-US" noProof="0" smtClean="0"/>
-              <a:t>11/29/2024</a:t>
+              <a:t>12/1/2024</a:t>
             </a:fld>
             <a:endParaRPr lang="en-US" noProof="0" dirty="0"/>
           </a:p>
@@ -2301,7 +2471,7 @@
           <a:p>
             <a:fld id="{F2DB7022-84E8-42F0-8AEA-ADED76AFD446}" type="datetime1">
               <a:rPr lang="en-US" smtClean="0"/>
-              <a:t>11/29/2024</a:t>
+              <a:t>12/1/2024</a:t>
             </a:fld>
             <a:endParaRPr lang="en-US" dirty="0"/>
           </a:p>
@@ -2696,7 +2866,7 @@
           <a:p>
             <a:fld id="{8D4C0741-442A-4788-81DA-4F081D559C5A}" type="datetime1">
               <a:rPr lang="en-US" noProof="0" smtClean="0"/>
-              <a:t>11/29/2024</a:t>
+              <a:t>12/1/2024</a:t>
             </a:fld>
             <a:endParaRPr lang="en-US" noProof="0" dirty="0"/>
           </a:p>
@@ -3172,7 +3342,7 @@
           <a:p>
             <a:fld id="{470BDB9F-6784-464D-8ED7-29E60E2B21A9}" type="datetime1">
               <a:rPr lang="en-US" noProof="0" smtClean="0"/>
-              <a:t>11/29/2024</a:t>
+              <a:t>12/1/2024</a:t>
             </a:fld>
             <a:endParaRPr lang="en-US" noProof="0" dirty="0"/>
           </a:p>
@@ -3556,7 +3726,7 @@
           <a:p>
             <a:fld id="{6DA3ABBD-A00D-4624-9D57-736F5DDBFABC}" type="datetime1">
               <a:rPr lang="en-US" noProof="0" smtClean="0"/>
-              <a:t>11/29/2024</a:t>
+              <a:t>12/1/2024</a:t>
             </a:fld>
             <a:endParaRPr lang="en-US" noProof="0" dirty="0"/>
           </a:p>
@@ -3917,7 +4087,7 @@
           <a:p>
             <a:fld id="{E6BF20AA-C418-460A-B9CF-8F3DD94C436D}" type="datetime1">
               <a:rPr lang="en-US" noProof="0" smtClean="0"/>
-              <a:t>11/29/2024</a:t>
+              <a:t>12/1/2024</a:t>
             </a:fld>
             <a:endParaRPr lang="en-US" noProof="0" dirty="0"/>
           </a:p>
@@ -4404,7 +4574,7 @@
           <a:p>
             <a:fld id="{063F5CE0-F8B8-4EAA-822E-6451047E7D5F}" type="datetime1">
               <a:rPr lang="en-US" noProof="0" smtClean="0"/>
-              <a:t>11/29/2024</a:t>
+              <a:t>12/1/2024</a:t>
             </a:fld>
             <a:endParaRPr lang="en-US" noProof="0" dirty="0"/>
           </a:p>
@@ -4898,7 +5068,7 @@
           <a:p>
             <a:fld id="{21F8AE65-7CE3-49A8-B2CC-A5A64E5730FA}" type="datetime1">
               <a:rPr lang="en-US" noProof="0" smtClean="0"/>
-              <a:t>11/29/2024</a:t>
+              <a:t>12/1/2024</a:t>
             </a:fld>
             <a:endParaRPr lang="en-US" noProof="0" dirty="0"/>
           </a:p>
@@ -5329,7 +5499,7 @@
           <a:p>
             <a:fld id="{B5046700-360D-4474-9946-7580E8968658}" type="datetime1">
               <a:rPr lang="en-US" noProof="0" smtClean="0"/>
-              <a:t>11/29/2024</a:t>
+              <a:t>12/1/2024</a:t>
             </a:fld>
             <a:endParaRPr lang="en-US" noProof="0" dirty="0"/>
           </a:p>
@@ -5582,7 +5752,7 @@
           <a:p>
             <a:fld id="{42F667F3-A942-43B7-9681-6435F4941075}" type="datetime1">
               <a:rPr lang="en-US" smtClean="0"/>
-              <a:t>11/29/2024</a:t>
+              <a:t>12/1/2024</a:t>
             </a:fld>
             <a:endParaRPr lang="en-US" dirty="0"/>
           </a:p>
@@ -5812,7 +5982,7 @@
           <a:p>
             <a:fld id="{666C8650-8C82-4FB0-9266-0148B376A8CE}" type="datetime1">
               <a:rPr lang="en-US" noProof="0" smtClean="0"/>
-              <a:t>11/29/2024</a:t>
+              <a:t>12/1/2024</a:t>
             </a:fld>
             <a:endParaRPr lang="en-US" noProof="0" dirty="0"/>
           </a:p>
@@ -6209,7 +6379,7 @@
           <a:p>
             <a:fld id="{5D576BB9-001A-4B59-8C51-603E71AE3226}" type="datetime1">
               <a:rPr lang="en-US" noProof="0" smtClean="0"/>
-              <a:t>11/29/2024</a:t>
+              <a:t>12/1/2024</a:t>
             </a:fld>
             <a:endParaRPr lang="en-US" noProof="0" dirty="0"/>
           </a:p>
@@ -6449,7 +6619,7 @@
           <a:p>
             <a:fld id="{1529DE01-3159-42E8-9946-B3F7564EBC72}" type="datetime1">
               <a:rPr lang="en-US" smtClean="0"/>
-              <a:t>11/29/2024</a:t>
+              <a:t>12/1/2024</a:t>
             </a:fld>
             <a:endParaRPr lang="en-US" dirty="0"/>
           </a:p>
@@ -6646,7 +6816,7 @@
           <a:p>
             <a:fld id="{1A1FC6A6-F894-471F-8AA4-AE4112290279}" type="datetime1">
               <a:rPr lang="en-US" noProof="0" smtClean="0"/>
-              <a:t>11/29/2024</a:t>
+              <a:t>12/1/2024</a:t>
             </a:fld>
             <a:endParaRPr lang="en-US" noProof="0" dirty="0"/>
           </a:p>
@@ -7100,7 +7270,7 @@
           <a:p>
             <a:fld id="{503D98FD-B63D-46E0-B974-EC5BBAC02E27}" type="datetime1">
               <a:rPr lang="en-US" noProof="0" smtClean="0"/>
-              <a:t>11/29/2024</a:t>
+              <a:t>12/1/2024</a:t>
             </a:fld>
             <a:endParaRPr lang="en-US" noProof="0" dirty="0"/>
           </a:p>
@@ -7677,7 +7847,7 @@
           <a:p>
             <a:fld id="{7E74ECCD-A9BB-4C40-8999-9FDE0B2AF02D}" type="datetime1">
               <a:rPr lang="en-US" smtClean="0"/>
-              <a:t>11/29/2024</a:t>
+              <a:t>12/1/2024</a:t>
             </a:fld>
             <a:endParaRPr lang="en-US" dirty="0"/>
           </a:p>
@@ -8077,7 +8247,7 @@
           <a:p>
             <a:fld id="{B9A11315-80A2-4A6F-99BC-2337EDBA509A}" type="datetime1">
               <a:rPr lang="en-US" smtClean="0"/>
-              <a:t>11/29/2024</a:t>
+              <a:t>12/1/2024</a:t>
             </a:fld>
             <a:endParaRPr lang="en-US" dirty="0"/>
           </a:p>
@@ -8216,7 +8386,7 @@
           <a:p>
             <a:fld id="{5323FCEE-D38D-4315-8661-B8B16CE6B114}" type="datetime1">
               <a:rPr lang="en-US" smtClean="0"/>
-              <a:t>11/29/2024</a:t>
+              <a:t>12/1/2024</a:t>
             </a:fld>
             <a:endParaRPr lang="en-US" dirty="0"/>
           </a:p>
@@ -8405,7 +8575,7 @@
           <a:p>
             <a:fld id="{27909053-E1DD-4959-BC7A-C98D3D2614DC}" type="datetime1">
               <a:rPr lang="en-US" noProof="0" smtClean="0"/>
-              <a:t>11/29/2024</a:t>
+              <a:t>12/1/2024</a:t>
             </a:fld>
             <a:endParaRPr lang="en-US" noProof="0" dirty="0"/>
           </a:p>
@@ -8717,7 +8887,7 @@
           <a:p>
             <a:fld id="{010F8E8D-DF54-49BE-BDBC-401B280C4E3C}" type="datetime1">
               <a:rPr lang="en-US" noProof="0" smtClean="0"/>
-              <a:t>11/29/2024</a:t>
+              <a:t>12/1/2024</a:t>
             </a:fld>
             <a:endParaRPr lang="en-US" noProof="0" dirty="0"/>
           </a:p>
@@ -9473,6 +9643,283 @@
 <file path=ppt/slides/slide10.xml><?xml version="1.0" encoding="utf-8"?>
 <p:sld xmlns:a="http://schemas.openxmlformats.org/drawingml/2006/main" xmlns:r="http://schemas.openxmlformats.org/officeDocument/2006/relationships" xmlns:p="http://schemas.openxmlformats.org/presentationml/2006/main">
   <p:cSld>
+    <p:spTree>
+      <p:nvGrpSpPr>
+        <p:cNvPr id="1" name=""/>
+        <p:cNvGrpSpPr/>
+        <p:nvPr/>
+      </p:nvGrpSpPr>
+      <p:grpSpPr>
+        <a:xfrm>
+          <a:off x="0" y="0"/>
+          <a:ext cx="0" cy="0"/>
+          <a:chOff x="0" y="0"/>
+          <a:chExt cx="0" cy="0"/>
+        </a:xfrm>
+      </p:grpSpPr>
+      <p:sp>
+        <p:nvSpPr>
+          <p:cNvPr id="8" name="Title 7">
+            <a:extLst>
+              <a:ext uri="{FF2B5EF4-FFF2-40B4-BE49-F238E27FC236}">
+                <a16:creationId xmlns:a16="http://schemas.microsoft.com/office/drawing/2014/main" id="{8050037D-17B6-4B6A-BF3A-E271DFEB9237}"/>
+              </a:ext>
+            </a:extLst>
+          </p:cNvPr>
+          <p:cNvSpPr>
+            <a:spLocks noGrp="1"/>
+          </p:cNvSpPr>
+          <p:nvPr>
+            <p:ph type="title"/>
+          </p:nvPr>
+        </p:nvSpPr>
+        <p:spPr/>
+        <p:txBody>
+          <a:bodyPr/>
+          <a:lstStyle/>
+          <a:p>
+            <a:r>
+              <a:rPr lang="en-US" dirty="0"/>
+              <a:t>Total Injuries per Year Classified by Make</a:t>
+            </a:r>
+          </a:p>
+        </p:txBody>
+      </p:sp>
+      <p:pic>
+        <p:nvPicPr>
+          <p:cNvPr id="4" name="Content Placeholder 3">
+            <a:extLst>
+              <a:ext uri="{FF2B5EF4-FFF2-40B4-BE49-F238E27FC236}">
+                <a16:creationId xmlns:a16="http://schemas.microsoft.com/office/drawing/2014/main" id="{DBF351CF-CC5F-4D47-8062-726B1AD46DCE}"/>
+              </a:ext>
+            </a:extLst>
+          </p:cNvPr>
+          <p:cNvPicPr>
+            <a:picLocks noGrp="1" noChangeAspect="1"/>
+          </p:cNvPicPr>
+          <p:nvPr>
+            <p:ph idx="1"/>
+          </p:nvPr>
+        </p:nvPicPr>
+        <p:blipFill>
+          <a:blip r:embed="rId3">
+            <a:extLst>
+              <a:ext uri="{28A0092B-C50C-407E-A947-70E740481C1C}">
+                <a14:useLocalDpi xmlns:a14="http://schemas.microsoft.com/office/drawing/2010/main" val="0"/>
+              </a:ext>
+            </a:extLst>
+          </a:blip>
+          <a:stretch>
+            <a:fillRect/>
+          </a:stretch>
+        </p:blipFill>
+        <p:spPr>
+          <a:xfrm>
+            <a:off x="1230842" y="2108200"/>
+            <a:ext cx="10028765" cy="3760787"/>
+          </a:xfrm>
+        </p:spPr>
+      </p:pic>
+      <p:sp>
+        <p:nvSpPr>
+          <p:cNvPr id="6" name="TextBox 5">
+            <a:extLst>
+              <a:ext uri="{FF2B5EF4-FFF2-40B4-BE49-F238E27FC236}">
+                <a16:creationId xmlns:a16="http://schemas.microsoft.com/office/drawing/2014/main" id="{540B12CC-62A7-4065-A8E0-EEC266F25E2C}"/>
+              </a:ext>
+            </a:extLst>
+          </p:cNvPr>
+          <p:cNvSpPr txBox="1"/>
+          <p:nvPr/>
+        </p:nvSpPr>
+        <p:spPr>
+          <a:xfrm>
+            <a:off x="1700463" y="1588168"/>
+            <a:ext cx="8277726" cy="707886"/>
+          </a:xfrm>
+          <a:prstGeom prst="rect">
+            <a:avLst/>
+          </a:prstGeom>
+          <a:noFill/>
+        </p:spPr>
+        <p:txBody>
+          <a:bodyPr wrap="square" rtlCol="0">
+            <a:spAutoFit/>
+          </a:bodyPr>
+          <a:lstStyle/>
+          <a:p>
+            <a:r>
+              <a:rPr lang="en-US" sz="2000" dirty="0"/>
+              <a:t>There is increase of accidents for all the aircraft make. Cessna has however from around 2003 has experienced a decline.</a:t>
+            </a:r>
+            <a:endParaRPr lang="en-KE" sz="2000" dirty="0"/>
+          </a:p>
+        </p:txBody>
+      </p:sp>
+    </p:spTree>
+    <p:extLst>
+      <p:ext uri="{BB962C8B-B14F-4D97-AF65-F5344CB8AC3E}">
+        <p14:creationId xmlns:p14="http://schemas.microsoft.com/office/powerpoint/2010/main" val="1861535825"/>
+      </p:ext>
+    </p:extLst>
+  </p:cSld>
+  <p:clrMapOvr>
+    <a:masterClrMapping/>
+  </p:clrMapOvr>
+</p:sld>
+</file>
+
+<file path=ppt/slides/slide11.xml><?xml version="1.0" encoding="utf-8"?>
+<p:sld xmlns:a="http://schemas.openxmlformats.org/drawingml/2006/main" xmlns:r="http://schemas.openxmlformats.org/officeDocument/2006/relationships" xmlns:p="http://schemas.openxmlformats.org/presentationml/2006/main">
+  <p:cSld>
+    <p:spTree>
+      <p:nvGrpSpPr>
+        <p:cNvPr id="1" name=""/>
+        <p:cNvGrpSpPr/>
+        <p:nvPr/>
+      </p:nvGrpSpPr>
+      <p:grpSpPr>
+        <a:xfrm>
+          <a:off x="0" y="0"/>
+          <a:ext cx="0" cy="0"/>
+          <a:chOff x="0" y="0"/>
+          <a:chExt cx="0" cy="0"/>
+        </a:xfrm>
+      </p:grpSpPr>
+      <p:sp>
+        <p:nvSpPr>
+          <p:cNvPr id="8" name="Title 7">
+            <a:extLst>
+              <a:ext uri="{FF2B5EF4-FFF2-40B4-BE49-F238E27FC236}">
+                <a16:creationId xmlns:a16="http://schemas.microsoft.com/office/drawing/2014/main" id="{8050037D-17B6-4B6A-BF3A-E271DFEB9237}"/>
+              </a:ext>
+            </a:extLst>
+          </p:cNvPr>
+          <p:cNvSpPr>
+            <a:spLocks noGrp="1"/>
+          </p:cNvSpPr>
+          <p:nvPr>
+            <p:ph type="title"/>
+          </p:nvPr>
+        </p:nvSpPr>
+        <p:spPr/>
+        <p:txBody>
+          <a:bodyPr/>
+          <a:lstStyle/>
+          <a:p>
+            <a:r>
+              <a:rPr lang="en-US" dirty="0"/>
+              <a:t>Recommendations/Next Steps</a:t>
+            </a:r>
+          </a:p>
+        </p:txBody>
+      </p:sp>
+      <p:sp>
+        <p:nvSpPr>
+          <p:cNvPr id="6" name="TextBox 5">
+            <a:extLst>
+              <a:ext uri="{FF2B5EF4-FFF2-40B4-BE49-F238E27FC236}">
+                <a16:creationId xmlns:a16="http://schemas.microsoft.com/office/drawing/2014/main" id="{540B12CC-62A7-4065-A8E0-EEC266F25E2C}"/>
+              </a:ext>
+            </a:extLst>
+          </p:cNvPr>
+          <p:cNvSpPr txBox="1"/>
+          <p:nvPr/>
+        </p:nvSpPr>
+        <p:spPr>
+          <a:xfrm>
+            <a:off x="1700463" y="1588168"/>
+            <a:ext cx="8277726" cy="4154984"/>
+          </a:xfrm>
+          <a:prstGeom prst="rect">
+            <a:avLst/>
+          </a:prstGeom>
+          <a:noFill/>
+        </p:spPr>
+        <p:txBody>
+          <a:bodyPr wrap="square" rtlCol="0">
+            <a:spAutoFit/>
+          </a:bodyPr>
+          <a:lstStyle/>
+          <a:p>
+            <a:pPr marL="342900" indent="-342900">
+              <a:buFont typeface="Wingdings" panose="05000000000000000000" pitchFamily="2" charset="2"/>
+              <a:buChar char="q"/>
+            </a:pPr>
+            <a:r>
+              <a:rPr lang="en-US" sz="2400" dirty="0"/>
+              <a:t>Cessna has the highest number of accidents, while Boeing has the fewest.</a:t>
+            </a:r>
+          </a:p>
+          <a:p>
+            <a:pPr marL="342900" indent="-342900">
+              <a:buFont typeface="Wingdings" panose="05000000000000000000" pitchFamily="2" charset="2"/>
+              <a:buChar char="q"/>
+            </a:pPr>
+            <a:r>
+              <a:rPr lang="en-US" sz="2400" dirty="0"/>
+              <a:t>Single-engine aircraft pose higher risks, whereas three-engine aircraft are safer.</a:t>
+            </a:r>
+          </a:p>
+          <a:p>
+            <a:pPr marL="342900" indent="-342900">
+              <a:buFont typeface="Wingdings" panose="05000000000000000000" pitchFamily="2" charset="2"/>
+              <a:buChar char="q"/>
+            </a:pPr>
+            <a:r>
+              <a:rPr lang="en-US" sz="2400" dirty="0"/>
+              <a:t>Aircraft from recommended makes include Cessna, Piper, and Beech.</a:t>
+            </a:r>
+          </a:p>
+          <a:p>
+            <a:pPr marL="342900" indent="-342900">
+              <a:buFont typeface="Wingdings" panose="05000000000000000000" pitchFamily="2" charset="2"/>
+              <a:buChar char="q"/>
+            </a:pPr>
+            <a:r>
+              <a:rPr lang="en-US" sz="2400" dirty="0"/>
+              <a:t>Two-engine aircraft cause fewer injuries.</a:t>
+            </a:r>
+          </a:p>
+          <a:p>
+            <a:pPr marL="342900" indent="-342900">
+              <a:buFont typeface="Wingdings" panose="05000000000000000000" pitchFamily="2" charset="2"/>
+              <a:buChar char="q"/>
+            </a:pPr>
+            <a:r>
+              <a:rPr lang="en-US" sz="2400" dirty="0"/>
+              <a:t>Accidents have been increasing over the years, with severity worsening.</a:t>
+            </a:r>
+          </a:p>
+          <a:p>
+            <a:pPr marL="342900" indent="-342900">
+              <a:buFont typeface="Wingdings" panose="05000000000000000000" pitchFamily="2" charset="2"/>
+              <a:buChar char="q"/>
+            </a:pPr>
+            <a:r>
+              <a:rPr lang="en-US" sz="2400" dirty="0"/>
+              <a:t>Accidents have risen for all aircraft makes, but Cessna has shown a decline since around 2003.</a:t>
+            </a:r>
+            <a:endParaRPr lang="en-KE" sz="2400" dirty="0"/>
+          </a:p>
+        </p:txBody>
+      </p:sp>
+    </p:spTree>
+    <p:extLst>
+      <p:ext uri="{BB962C8B-B14F-4D97-AF65-F5344CB8AC3E}">
+        <p14:creationId xmlns:p14="http://schemas.microsoft.com/office/powerpoint/2010/main" val="1570183644"/>
+      </p:ext>
+    </p:extLst>
+  </p:cSld>
+  <p:clrMapOvr>
+    <a:masterClrMapping/>
+  </p:clrMapOvr>
+</p:sld>
+</file>
+
+<file path=ppt/slides/slide12.xml><?xml version="1.0" encoding="utf-8"?>
+<p:sld xmlns:a="http://schemas.openxmlformats.org/drawingml/2006/main" xmlns:r="http://schemas.openxmlformats.org/officeDocument/2006/relationships" xmlns:p="http://schemas.openxmlformats.org/presentationml/2006/main">
+  <p:cSld>
     <p:bg>
       <p:bgPr>
         <a:solidFill>
@@ -9819,6 +10266,127 @@
 </file>
 
 <file path=ppt/slides/slide2.xml><?xml version="1.0" encoding="utf-8"?>
+<p:sld xmlns:a="http://schemas.openxmlformats.org/drawingml/2006/main" xmlns:r="http://schemas.openxmlformats.org/officeDocument/2006/relationships" xmlns:p="http://schemas.openxmlformats.org/presentationml/2006/main">
+  <p:cSld>
+    <p:bg>
+      <p:bgPr>
+        <a:solidFill>
+          <a:schemeClr val="bg1"/>
+        </a:solidFill>
+        <a:effectLst/>
+      </p:bgPr>
+    </p:bg>
+    <p:spTree>
+      <p:nvGrpSpPr>
+        <p:cNvPr id="1" name=""/>
+        <p:cNvGrpSpPr/>
+        <p:nvPr/>
+      </p:nvGrpSpPr>
+      <p:grpSpPr>
+        <a:xfrm>
+          <a:off x="0" y="0"/>
+          <a:ext cx="0" cy="0"/>
+          <a:chOff x="0" y="0"/>
+          <a:chExt cx="0" cy="0"/>
+        </a:xfrm>
+      </p:grpSpPr>
+      <p:sp>
+        <p:nvSpPr>
+          <p:cNvPr id="7" name="Title 6">
+            <a:extLst>
+              <a:ext uri="{FF2B5EF4-FFF2-40B4-BE49-F238E27FC236}">
+                <a16:creationId xmlns:a16="http://schemas.microsoft.com/office/drawing/2014/main" id="{4613E22E-01DB-414D-9831-64C0E2A8B3ED}"/>
+              </a:ext>
+            </a:extLst>
+          </p:cNvPr>
+          <p:cNvSpPr>
+            <a:spLocks noGrp="1"/>
+          </p:cNvSpPr>
+          <p:nvPr>
+            <p:ph type="title"/>
+          </p:nvPr>
+        </p:nvSpPr>
+        <p:spPr>
+          <a:xfrm>
+            <a:off x="1097280" y="286603"/>
+            <a:ext cx="10058400" cy="1450757"/>
+          </a:xfrm>
+        </p:spPr>
+        <p:txBody>
+          <a:bodyPr>
+            <a:normAutofit/>
+          </a:bodyPr>
+          <a:lstStyle/>
+          <a:p>
+            <a:r>
+              <a:rPr lang="en-US" dirty="0"/>
+              <a:t>Business Overview</a:t>
+            </a:r>
+          </a:p>
+        </p:txBody>
+      </p:sp>
+      <p:sp>
+        <p:nvSpPr>
+          <p:cNvPr id="5" name="TextBox 4">
+            <a:extLst>
+              <a:ext uri="{FF2B5EF4-FFF2-40B4-BE49-F238E27FC236}">
+                <a16:creationId xmlns:a16="http://schemas.microsoft.com/office/drawing/2014/main" id="{B4D8C307-AC48-445A-AA5F-C7E69F687456}"/>
+              </a:ext>
+            </a:extLst>
+          </p:cNvPr>
+          <p:cNvSpPr txBox="1"/>
+          <p:nvPr/>
+        </p:nvSpPr>
+        <p:spPr>
+          <a:xfrm>
+            <a:off x="866274" y="1941095"/>
+            <a:ext cx="9128626" cy="3416320"/>
+          </a:xfrm>
+          <a:prstGeom prst="rect">
+            <a:avLst/>
+          </a:prstGeom>
+          <a:noFill/>
+        </p:spPr>
+        <p:txBody>
+          <a:bodyPr wrap="square" rtlCol="0">
+            <a:spAutoFit/>
+          </a:bodyPr>
+          <a:lstStyle/>
+          <a:p>
+            <a:r>
+              <a:rPr lang="en-US" sz="2400" dirty="0"/>
+              <a:t>My company is expanding into new industries to diversify its portfolio and is exploring the purchase and operation of airplanes for both commercial and private use. </a:t>
+            </a:r>
+          </a:p>
+          <a:p>
+            <a:r>
+              <a:rPr lang="en-US" sz="2400" dirty="0"/>
+              <a:t>I have been tasked with identifying potential risks associated with aircraft and determining which options pose the lowest risk for this new business venture.</a:t>
+            </a:r>
+          </a:p>
+          <a:p>
+            <a:r>
+              <a:rPr lang="en-US" sz="2400" dirty="0"/>
+              <a:t> My findings will then be translated into actionable insights to guide the head of the new aviation division in making informed decisions about aircraft purchases.</a:t>
+            </a:r>
+            <a:endParaRPr lang="en-KE" sz="2400" dirty="0"/>
+          </a:p>
+        </p:txBody>
+      </p:sp>
+    </p:spTree>
+    <p:extLst>
+      <p:ext uri="{BB962C8B-B14F-4D97-AF65-F5344CB8AC3E}">
+        <p14:creationId xmlns:p14="http://schemas.microsoft.com/office/powerpoint/2010/main" val="3816056523"/>
+      </p:ext>
+    </p:extLst>
+  </p:cSld>
+  <p:clrMapOvr>
+    <a:masterClrMapping/>
+  </p:clrMapOvr>
+</p:sld>
+</file>
+
+<file path=ppt/slides/slide3.xml><?xml version="1.0" encoding="utf-8"?>
 <p:sld xmlns:a="http://schemas.openxmlformats.org/drawingml/2006/main" xmlns:r="http://schemas.openxmlformats.org/officeDocument/2006/relationships" xmlns:p="http://schemas.openxmlformats.org/presentationml/2006/main">
   <p:cSld>
     <p:spTree>
@@ -10222,7 +10790,7 @@
 </p:sld>
 </file>
 
-<file path=ppt/slides/slide3.xml><?xml version="1.0" encoding="utf-8"?>
+<file path=ppt/slides/slide4.xml><?xml version="1.0" encoding="utf-8"?>
 <p:sld xmlns:a="http://schemas.openxmlformats.org/drawingml/2006/main" xmlns:r="http://schemas.openxmlformats.org/officeDocument/2006/relationships" xmlns:p="http://schemas.openxmlformats.org/presentationml/2006/main">
   <p:cSld>
     <p:spTree>
@@ -10359,150 +10927,6 @@
     <p:extLst>
       <p:ext uri="{BB962C8B-B14F-4D97-AF65-F5344CB8AC3E}">
         <p14:creationId xmlns:p14="http://schemas.microsoft.com/office/powerpoint/2010/main" val="81488864"/>
-      </p:ext>
-    </p:extLst>
-  </p:cSld>
-  <p:clrMapOvr>
-    <a:masterClrMapping/>
-  </p:clrMapOvr>
-</p:sld>
-</file>
-
-<file path=ppt/slides/slide4.xml><?xml version="1.0" encoding="utf-8"?>
-<p:sld xmlns:a="http://schemas.openxmlformats.org/drawingml/2006/main" xmlns:r="http://schemas.openxmlformats.org/officeDocument/2006/relationships" xmlns:p="http://schemas.openxmlformats.org/presentationml/2006/main">
-  <p:cSld>
-    <p:bg>
-      <p:bgPr>
-        <a:solidFill>
-          <a:schemeClr val="bg1"/>
-        </a:solidFill>
-        <a:effectLst/>
-      </p:bgPr>
-    </p:bg>
-    <p:spTree>
-      <p:nvGrpSpPr>
-        <p:cNvPr id="1" name=""/>
-        <p:cNvGrpSpPr/>
-        <p:nvPr/>
-      </p:nvGrpSpPr>
-      <p:grpSpPr>
-        <a:xfrm>
-          <a:off x="0" y="0"/>
-          <a:ext cx="0" cy="0"/>
-          <a:chOff x="0" y="0"/>
-          <a:chExt cx="0" cy="0"/>
-        </a:xfrm>
-      </p:grpSpPr>
-      <p:sp>
-        <p:nvSpPr>
-          <p:cNvPr id="7" name="Title 6">
-            <a:extLst>
-              <a:ext uri="{FF2B5EF4-FFF2-40B4-BE49-F238E27FC236}">
-                <a16:creationId xmlns:a16="http://schemas.microsoft.com/office/drawing/2014/main" id="{4613E22E-01DB-414D-9831-64C0E2A8B3ED}"/>
-              </a:ext>
-            </a:extLst>
-          </p:cNvPr>
-          <p:cNvSpPr>
-            <a:spLocks noGrp="1"/>
-          </p:cNvSpPr>
-          <p:nvPr>
-            <p:ph type="title"/>
-          </p:nvPr>
-        </p:nvSpPr>
-        <p:spPr>
-          <a:xfrm>
-            <a:off x="1097280" y="286603"/>
-            <a:ext cx="10058400" cy="1450757"/>
-          </a:xfrm>
-        </p:spPr>
-        <p:txBody>
-          <a:bodyPr>
-            <a:normAutofit/>
-          </a:bodyPr>
-          <a:lstStyle/>
-          <a:p>
-            <a:r>
-              <a:rPr lang="en-US" dirty="0"/>
-              <a:t>Number of Accidents per Make</a:t>
-            </a:r>
-          </a:p>
-        </p:txBody>
-      </p:sp>
-      <p:pic>
-        <p:nvPicPr>
-          <p:cNvPr id="4" name="Content Placeholder 3">
-            <a:extLst>
-              <a:ext uri="{FF2B5EF4-FFF2-40B4-BE49-F238E27FC236}">
-                <a16:creationId xmlns:a16="http://schemas.microsoft.com/office/drawing/2014/main" id="{53A81AC5-F508-4A43-B643-FE7060D50F17}"/>
-              </a:ext>
-            </a:extLst>
-          </p:cNvPr>
-          <p:cNvPicPr>
-            <a:picLocks noGrp="1" noChangeAspect="1"/>
-          </p:cNvPicPr>
-          <p:nvPr>
-            <p:ph idx="1"/>
-          </p:nvPr>
-        </p:nvPicPr>
-        <p:blipFill>
-          <a:blip r:embed="rId3">
-            <a:extLst>
-              <a:ext uri="{28A0092B-C50C-407E-A947-70E740481C1C}">
-                <a14:useLocalDpi xmlns:a14="http://schemas.microsoft.com/office/drawing/2010/main" val="0"/>
-              </a:ext>
-            </a:extLst>
-          </a:blip>
-          <a:stretch>
-            <a:fillRect/>
-          </a:stretch>
-        </p:blipFill>
-        <p:spPr>
-          <a:xfrm>
-            <a:off x="721895" y="2509067"/>
-            <a:ext cx="9817767" cy="3602975"/>
-          </a:xfrm>
-        </p:spPr>
-      </p:pic>
-      <p:sp>
-        <p:nvSpPr>
-          <p:cNvPr id="5" name="TextBox 4">
-            <a:extLst>
-              <a:ext uri="{FF2B5EF4-FFF2-40B4-BE49-F238E27FC236}">
-                <a16:creationId xmlns:a16="http://schemas.microsoft.com/office/drawing/2014/main" id="{B4D8C307-AC48-445A-AA5F-C7E69F687456}"/>
-              </a:ext>
-            </a:extLst>
-          </p:cNvPr>
-          <p:cNvSpPr txBox="1"/>
-          <p:nvPr/>
-        </p:nvSpPr>
-        <p:spPr>
-          <a:xfrm>
-            <a:off x="866274" y="1941095"/>
-            <a:ext cx="7571873" cy="369332"/>
-          </a:xfrm>
-          <a:prstGeom prst="rect">
-            <a:avLst/>
-          </a:prstGeom>
-          <a:noFill/>
-        </p:spPr>
-        <p:txBody>
-          <a:bodyPr wrap="square" rtlCol="0">
-            <a:spAutoFit/>
-          </a:bodyPr>
-          <a:lstStyle/>
-          <a:p>
-            <a:r>
-              <a:rPr lang="en-US" dirty="0"/>
-              <a:t>Cessna has most accidents while Boeing has least</a:t>
-            </a:r>
-            <a:endParaRPr lang="en-KE" dirty="0"/>
-          </a:p>
-        </p:txBody>
-      </p:sp>
-    </p:spTree>
-    <p:extLst>
-      <p:ext uri="{BB962C8B-B14F-4D97-AF65-F5344CB8AC3E}">
-        <p14:creationId xmlns:p14="http://schemas.microsoft.com/office/powerpoint/2010/main" val="3816056523"/>
       </p:ext>
     </p:extLst>
   </p:cSld>
@@ -10567,7 +10991,7 @@
           <a:p>
             <a:r>
               <a:rPr lang="en-US" dirty="0"/>
-              <a:t>Comparison of Number of Engines to Total Fatal Injuries</a:t>
+              <a:t>Number of Accidents per Make</a:t>
             </a:r>
           </a:p>
         </p:txBody>
@@ -10602,8 +11026,8 @@
         </p:blipFill>
         <p:spPr>
           <a:xfrm>
-            <a:off x="1097280" y="2509067"/>
-            <a:ext cx="8608194" cy="3602975"/>
+            <a:off x="721895" y="2509067"/>
+            <a:ext cx="9817767" cy="3602975"/>
           </a:xfrm>
         </p:spPr>
       </p:pic>
@@ -10637,15 +11061,7 @@
           <a:p>
             <a:r>
               <a:rPr lang="en-US" dirty="0"/>
-              <a:t>Aircraft with </a:t>
-            </a:r>
-            <a:r>
-              <a:rPr lang="en-US" dirty="0" err="1"/>
-              <a:t>number_of_engines</a:t>
-            </a:r>
-            <a:r>
-              <a:rPr lang="en-US" dirty="0"/>
-              <a:t> = 1 is high risk and with 3 engines is low risk</a:t>
+              <a:t>Cessna has most accidents while Boeing has least</a:t>
             </a:r>
             <a:endParaRPr lang="en-KE" dirty="0"/>
           </a:p>
@@ -10654,7 +11070,7 @@
     </p:spTree>
     <p:extLst>
       <p:ext uri="{BB962C8B-B14F-4D97-AF65-F5344CB8AC3E}">
-        <p14:creationId xmlns:p14="http://schemas.microsoft.com/office/powerpoint/2010/main" val="857560692"/>
+        <p14:creationId xmlns:p14="http://schemas.microsoft.com/office/powerpoint/2010/main" val="2016284073"/>
       </p:ext>
     </p:extLst>
   </p:cSld>
@@ -10667,6 +11083,14 @@
 <file path=ppt/slides/slide6.xml><?xml version="1.0" encoding="utf-8"?>
 <p:sld xmlns:a="http://schemas.openxmlformats.org/drawingml/2006/main" xmlns:r="http://schemas.openxmlformats.org/officeDocument/2006/relationships" xmlns:p="http://schemas.openxmlformats.org/presentationml/2006/main">
   <p:cSld>
+    <p:bg>
+      <p:bgPr>
+        <a:solidFill>
+          <a:schemeClr val="bg1"/>
+        </a:solidFill>
+        <a:effectLst/>
+      </p:bgPr>
+    </p:bg>
     <p:spTree>
       <p:nvGrpSpPr>
         <p:cNvPr id="1" name=""/>
@@ -10683,10 +11107,10 @@
       </p:grpSpPr>
       <p:sp>
         <p:nvSpPr>
-          <p:cNvPr id="6" name="Title 5">
-            <a:extLst>
-              <a:ext uri="{FF2B5EF4-FFF2-40B4-BE49-F238E27FC236}">
-                <a16:creationId xmlns:a16="http://schemas.microsoft.com/office/drawing/2014/main" id="{B5BA7203-E18A-4594-9991-EFE3B8E4D591}"/>
+          <p:cNvPr id="7" name="Title 6">
+            <a:extLst>
+              <a:ext uri="{FF2B5EF4-FFF2-40B4-BE49-F238E27FC236}">
+                <a16:creationId xmlns:a16="http://schemas.microsoft.com/office/drawing/2014/main" id="{4613E22E-01DB-414D-9831-64C0E2A8B3ED}"/>
               </a:ext>
             </a:extLst>
           </p:cNvPr>
@@ -10697,7 +11121,12 @@
             <p:ph type="title"/>
           </p:nvPr>
         </p:nvSpPr>
-        <p:spPr/>
+        <p:spPr>
+          <a:xfrm>
+            <a:off x="1097280" y="286603"/>
+            <a:ext cx="10058400" cy="1450757"/>
+          </a:xfrm>
+        </p:spPr>
         <p:txBody>
           <a:bodyPr>
             <a:normAutofit/>
@@ -10705,8 +11134,8 @@
           <a:lstStyle/>
           <a:p>
             <a:r>
-              <a:rPr lang="en-US" sz="3600" dirty="0"/>
-              <a:t>Number of Aircrafts by Make Classified by Number of Engines</a:t>
+              <a:rPr lang="en-US" dirty="0"/>
+              <a:t>Comparison of Number of Engines to Total Fatal Injuries</a:t>
             </a:r>
           </a:p>
         </p:txBody>
@@ -10716,7 +11145,7 @@
           <p:cNvPr id="4" name="Content Placeholder 3">
             <a:extLst>
               <a:ext uri="{FF2B5EF4-FFF2-40B4-BE49-F238E27FC236}">
-                <a16:creationId xmlns:a16="http://schemas.microsoft.com/office/drawing/2014/main" id="{7EA82B7A-0482-42FF-BC8B-6BCE3516F17A}"/>
+                <a16:creationId xmlns:a16="http://schemas.microsoft.com/office/drawing/2014/main" id="{53A81AC5-F508-4A43-B643-FE7060D50F17}"/>
               </a:ext>
             </a:extLst>
           </p:cNvPr>
@@ -10741,8 +11170,8 @@
         </p:blipFill>
         <p:spPr>
           <a:xfrm>
-            <a:off x="653325" y="2325163"/>
-            <a:ext cx="10028768" cy="3754795"/>
+            <a:off x="1097280" y="2509067"/>
+            <a:ext cx="8608194" cy="3602975"/>
           </a:xfrm>
         </p:spPr>
       </p:pic>
@@ -10751,7 +11180,7 @@
           <p:cNvPr id="5" name="TextBox 4">
             <a:extLst>
               <a:ext uri="{FF2B5EF4-FFF2-40B4-BE49-F238E27FC236}">
-                <a16:creationId xmlns:a16="http://schemas.microsoft.com/office/drawing/2014/main" id="{DE4D65B9-7944-4A82-AD65-B1621DFF4CAF}"/>
+                <a16:creationId xmlns:a16="http://schemas.microsoft.com/office/drawing/2014/main" id="{B4D8C307-AC48-445A-AA5F-C7E69F687456}"/>
               </a:ext>
             </a:extLst>
           </p:cNvPr>
@@ -10760,8 +11189,8 @@
         </p:nvSpPr>
         <p:spPr>
           <a:xfrm>
-            <a:off x="1230841" y="1925053"/>
-            <a:ext cx="8234001" cy="400110"/>
+            <a:off x="1036454" y="1938547"/>
+            <a:ext cx="7571873" cy="369332"/>
           </a:xfrm>
           <a:prstGeom prst="rect">
             <a:avLst/>
@@ -10775,17 +11204,25 @@
           <a:lstStyle/>
           <a:p>
             <a:r>
-              <a:rPr lang="en-US" sz="2000" dirty="0"/>
-              <a:t> Aircraft with Make recommended is either Cessna, Piper or Beech</a:t>
-            </a:r>
-            <a:endParaRPr lang="en-KE" sz="2000" dirty="0"/>
+              <a:rPr lang="en-US" dirty="0"/>
+              <a:t>Aircraft with </a:t>
+            </a:r>
+            <a:r>
+              <a:rPr lang="en-US" dirty="0" err="1"/>
+              <a:t>number_of_engines</a:t>
+            </a:r>
+            <a:r>
+              <a:rPr lang="en-US" dirty="0"/>
+              <a:t> = 1 is high risk and with 3 engines is low risk</a:t>
+            </a:r>
+            <a:endParaRPr lang="en-KE" dirty="0"/>
           </a:p>
         </p:txBody>
       </p:sp>
     </p:spTree>
     <p:extLst>
       <p:ext uri="{BB962C8B-B14F-4D97-AF65-F5344CB8AC3E}">
-        <p14:creationId xmlns:p14="http://schemas.microsoft.com/office/powerpoint/2010/main" val="1284200841"/>
+        <p14:creationId xmlns:p14="http://schemas.microsoft.com/office/powerpoint/2010/main" val="857560692"/>
       </p:ext>
     </p:extLst>
   </p:cSld>
@@ -10828,12 +11265,7 @@
             <p:ph type="title"/>
           </p:nvPr>
         </p:nvSpPr>
-        <p:spPr>
-          <a:xfrm>
-            <a:off x="1097280" y="930442"/>
-            <a:ext cx="10058400" cy="806918"/>
-          </a:xfrm>
-        </p:spPr>
+        <p:spPr/>
         <p:txBody>
           <a:bodyPr>
             <a:normAutofit/>
@@ -10842,7 +11274,7 @@
           <a:p>
             <a:r>
               <a:rPr lang="en-US" sz="3600" dirty="0"/>
-              <a:t>Total Uninjured to  Number of Engines</a:t>
+              <a:t>Number of Aircrafts by Make Classified by Number of Engines</a:t>
             </a:r>
           </a:p>
         </p:txBody>
@@ -10912,7 +11344,7 @@
           <a:p>
             <a:r>
               <a:rPr lang="en-US" sz="2000" dirty="0"/>
-              <a:t>Engines with 2 injuries caused less harm.</a:t>
+              <a:t> Aircraft with Make recommended is either Cessna, Piper or Beech</a:t>
             </a:r>
             <a:endParaRPr lang="en-KE" sz="2000" dirty="0"/>
           </a:p>
@@ -10921,7 +11353,7 @@
     </p:spTree>
     <p:extLst>
       <p:ext uri="{BB962C8B-B14F-4D97-AF65-F5344CB8AC3E}">
-        <p14:creationId xmlns:p14="http://schemas.microsoft.com/office/powerpoint/2010/main" val="2200346972"/>
+        <p14:creationId xmlns:p14="http://schemas.microsoft.com/office/powerpoint/2010/main" val="1284200841"/>
       </p:ext>
     </p:extLst>
   </p:cSld>
@@ -10950,10 +11382,10 @@
       </p:grpSpPr>
       <p:sp>
         <p:nvSpPr>
-          <p:cNvPr id="8" name="Title 7">
-            <a:extLst>
-              <a:ext uri="{FF2B5EF4-FFF2-40B4-BE49-F238E27FC236}">
-                <a16:creationId xmlns:a16="http://schemas.microsoft.com/office/drawing/2014/main" id="{8050037D-17B6-4B6A-BF3A-E271DFEB9237}"/>
+          <p:cNvPr id="6" name="Title 5">
+            <a:extLst>
+              <a:ext uri="{FF2B5EF4-FFF2-40B4-BE49-F238E27FC236}">
+                <a16:creationId xmlns:a16="http://schemas.microsoft.com/office/drawing/2014/main" id="{B5BA7203-E18A-4594-9991-EFE3B8E4D591}"/>
               </a:ext>
             </a:extLst>
           </p:cNvPr>
@@ -10964,14 +11396,21 @@
             <p:ph type="title"/>
           </p:nvPr>
         </p:nvSpPr>
-        <p:spPr/>
-        <p:txBody>
-          <a:bodyPr/>
+        <p:spPr>
+          <a:xfrm>
+            <a:off x="1097280" y="930442"/>
+            <a:ext cx="10058400" cy="806918"/>
+          </a:xfrm>
+        </p:spPr>
+        <p:txBody>
+          <a:bodyPr>
+            <a:normAutofit/>
+          </a:bodyPr>
           <a:lstStyle/>
           <a:p>
             <a:r>
-              <a:rPr lang="en-US" dirty="0"/>
-              <a:t>Total Injuries per Year Classified by Severity</a:t>
+              <a:rPr lang="en-US" sz="3600" dirty="0"/>
+              <a:t>Total Uninjured to  Number of Engines</a:t>
             </a:r>
           </a:p>
         </p:txBody>
@@ -10981,7 +11420,7 @@
           <p:cNvPr id="4" name="Content Placeholder 3">
             <a:extLst>
               <a:ext uri="{FF2B5EF4-FFF2-40B4-BE49-F238E27FC236}">
-                <a16:creationId xmlns:a16="http://schemas.microsoft.com/office/drawing/2014/main" id="{DBF351CF-CC5F-4D47-8062-726B1AD46DCE}"/>
+                <a16:creationId xmlns:a16="http://schemas.microsoft.com/office/drawing/2014/main" id="{7EA82B7A-0482-42FF-BC8B-6BCE3516F17A}"/>
               </a:ext>
             </a:extLst>
           </p:cNvPr>
@@ -11006,17 +11445,17 @@
         </p:blipFill>
         <p:spPr>
           <a:xfrm>
-            <a:off x="1230841" y="2108200"/>
-            <a:ext cx="10028768" cy="3760787"/>
+            <a:off x="653325" y="2325163"/>
+            <a:ext cx="10028768" cy="3754795"/>
           </a:xfrm>
         </p:spPr>
       </p:pic>
       <p:sp>
         <p:nvSpPr>
-          <p:cNvPr id="6" name="TextBox 5">
-            <a:extLst>
-              <a:ext uri="{FF2B5EF4-FFF2-40B4-BE49-F238E27FC236}">
-                <a16:creationId xmlns:a16="http://schemas.microsoft.com/office/drawing/2014/main" id="{540B12CC-62A7-4065-A8E0-EEC266F25E2C}"/>
+          <p:cNvPr id="5" name="TextBox 4">
+            <a:extLst>
+              <a:ext uri="{FF2B5EF4-FFF2-40B4-BE49-F238E27FC236}">
+                <a16:creationId xmlns:a16="http://schemas.microsoft.com/office/drawing/2014/main" id="{DE4D65B9-7944-4A82-AD65-B1621DFF4CAF}"/>
               </a:ext>
             </a:extLst>
           </p:cNvPr>
@@ -11025,8 +11464,8 @@
         </p:nvSpPr>
         <p:spPr>
           <a:xfrm>
-            <a:off x="1700463" y="1588168"/>
-            <a:ext cx="8277726" cy="400110"/>
+            <a:off x="1230841" y="1925053"/>
+            <a:ext cx="8234001" cy="400110"/>
           </a:xfrm>
           <a:prstGeom prst="rect">
             <a:avLst/>
@@ -11041,7 +11480,7 @@
           <a:p>
             <a:r>
               <a:rPr lang="en-US" sz="2000" dirty="0"/>
-              <a:t>There is increase of accidents over the years with severity getting worse</a:t>
+              <a:t>Engines with 2 injuries caused less harm.</a:t>
             </a:r>
             <a:endParaRPr lang="en-KE" sz="2000" dirty="0"/>
           </a:p>
@@ -11050,7 +11489,7 @@
     </p:spTree>
     <p:extLst>
       <p:ext uri="{BB962C8B-B14F-4D97-AF65-F5344CB8AC3E}">
-        <p14:creationId xmlns:p14="http://schemas.microsoft.com/office/powerpoint/2010/main" val="3888068549"/>
+        <p14:creationId xmlns:p14="http://schemas.microsoft.com/office/powerpoint/2010/main" val="2200346972"/>
       </p:ext>
     </p:extLst>
   </p:cSld>
@@ -11100,7 +11539,7 @@
           <a:p>
             <a:r>
               <a:rPr lang="en-US" dirty="0"/>
-              <a:t>Total Injuries per Year Classified by Make</a:t>
+              <a:t>Total Injuries per Year Classified by Severity</a:t>
             </a:r>
           </a:p>
         </p:txBody>
@@ -11135,8 +11574,8 @@
         </p:blipFill>
         <p:spPr>
           <a:xfrm>
-            <a:off x="1230842" y="2108200"/>
-            <a:ext cx="10028765" cy="3760787"/>
+            <a:off x="1230841" y="2108200"/>
+            <a:ext cx="10028768" cy="3760787"/>
           </a:xfrm>
         </p:spPr>
       </p:pic>
@@ -11155,7 +11594,7 @@
         <p:spPr>
           <a:xfrm>
             <a:off x="1700463" y="1588168"/>
-            <a:ext cx="8277726" cy="707886"/>
+            <a:ext cx="8277726" cy="400110"/>
           </a:xfrm>
           <a:prstGeom prst="rect">
             <a:avLst/>
@@ -11170,7 +11609,7 @@
           <a:p>
             <a:r>
               <a:rPr lang="en-US" sz="2000" dirty="0"/>
-              <a:t>There is increase of accidents for all the aircraft make. Cessna has however from around 2003 has experienced a decline.</a:t>
+              <a:t>There is increase of accidents over the years with severity getting worse</a:t>
             </a:r>
             <a:endParaRPr lang="en-KE" sz="2000" dirty="0"/>
           </a:p>
@@ -11179,7 +11618,7 @@
     </p:spTree>
     <p:extLst>
       <p:ext uri="{BB962C8B-B14F-4D97-AF65-F5344CB8AC3E}">
-        <p14:creationId xmlns:p14="http://schemas.microsoft.com/office/powerpoint/2010/main" val="1861535825"/>
+        <p14:creationId xmlns:p14="http://schemas.microsoft.com/office/powerpoint/2010/main" val="3888068549"/>
       </p:ext>
     </p:extLst>
   </p:cSld>
@@ -12072,15 +12511,6 @@
 </file>
 
 <file path=customXml/item2.xml><?xml version="1.0" encoding="utf-8"?>
-<?mso-contentType ?>
-<FormTemplates xmlns="http://schemas.microsoft.com/sharepoint/v3/contenttype/forms">
-  <Display>DocumentLibraryForm</Display>
-  <Edit>DocumentLibraryForm</Edit>
-  <New>DocumentLibraryForm</New>
-</FormTemplates>
-</file>
-
-<file path=customXml/item3.xml><?xml version="1.0" encoding="utf-8"?>
 <ct:contentTypeSchema xmlns:ct="http://schemas.microsoft.com/office/2006/metadata/contentType" xmlns:ma="http://schemas.microsoft.com/office/2006/metadata/properties/metaAttributes" ct:_="" ma:_="" ma:contentTypeName="Document" ma:contentTypeID="0x01010079F111ED35F8CC479449609E8A0923A6" ma:contentTypeVersion="12" ma:contentTypeDescription="Create a new document." ma:contentTypeScope="" ma:versionID="fa6e671f1cd7e4d96ff9652be322dd5e">
   <xsd:schema xmlns:xsd="http://www.w3.org/2001/XMLSchema" xmlns:xs="http://www.w3.org/2001/XMLSchema" xmlns:p="http://schemas.microsoft.com/office/2006/metadata/properties" xmlns:ns2="71af3243-3dd4-4a8d-8c0d-dd76da1f02a5" xmlns:ns3="16c05727-aa75-4e4a-9b5f-8a80a1165891" targetNamespace="http://schemas.microsoft.com/office/2006/metadata/properties" ma:root="true" ma:fieldsID="4e2496f70b101db0b8013f30a071bbf7" ns2:_="" ns3:_="">
     <xsd:import namespace="71af3243-3dd4-4a8d-8c0d-dd76da1f02a5"/>
@@ -12301,6 +12731,15 @@
 </ct:contentTypeSchema>
 </file>
 
+<file path=customXml/item3.xml><?xml version="1.0" encoding="utf-8"?>
+<?mso-contentType ?>
+<FormTemplates xmlns="http://schemas.microsoft.com/sharepoint/v3/contenttype/forms">
+  <Display>DocumentLibraryForm</Display>
+  <Edit>DocumentLibraryForm</Edit>
+  <New>DocumentLibraryForm</New>
+</FormTemplates>
+</file>
+
 <file path=customXml/itemProps1.xml><?xml version="1.0" encoding="utf-8"?>
 <ds:datastoreItem xmlns:ds="http://schemas.openxmlformats.org/officeDocument/2006/customXml" ds:itemID="{A4E879E6-8FFE-4154-8F2A-F7518B89B376}">
   <ds:schemaRefs>
@@ -12319,14 +12758,6 @@
 </file>
 
 <file path=customXml/itemProps2.xml><?xml version="1.0" encoding="utf-8"?>
-<ds:datastoreItem xmlns:ds="http://schemas.openxmlformats.org/officeDocument/2006/customXml" ds:itemID="{7E0A2CB4-6869-426F-8BC4-A32C90CBE263}">
-  <ds:schemaRefs>
-    <ds:schemaRef ds:uri="http://schemas.microsoft.com/sharepoint/v3/contenttype/forms"/>
-  </ds:schemaRefs>
-</ds:datastoreItem>
-</file>
-
-<file path=customXml/itemProps3.xml><?xml version="1.0" encoding="utf-8"?>
 <ds:datastoreItem xmlns:ds="http://schemas.openxmlformats.org/officeDocument/2006/customXml" ds:itemID="{A941CA7C-A0BF-44EF-B2E5-7539C3B9B0B6}">
   <ds:schemaRefs>
     <ds:schemaRef ds:uri="http://schemas.microsoft.com/office/2006/metadata/contentType"/>
@@ -12343,4 +12774,12 @@
     <ds:schemaRef ds:uri="http://schemas.microsoft.com/internal/obd"/>
   </ds:schemaRefs>
 </ds:datastoreItem>
+</file>
+
+<file path=customXml/itemProps3.xml><?xml version="1.0" encoding="utf-8"?>
+<ds:datastoreItem xmlns:ds="http://schemas.openxmlformats.org/officeDocument/2006/customXml" ds:itemID="{7E0A2CB4-6869-426F-8BC4-A32C90CBE263}">
+  <ds:schemaRefs>
+    <ds:schemaRef ds:uri="http://schemas.microsoft.com/sharepoint/v3/contenttype/forms"/>
+  </ds:schemaRefs>
+</ds:datastoreItem>
 </file>
</xml_diff>